<commit_message>
Added the poster final version pptx
</commit_message>
<xml_diff>
--- a/Grupo1_P2-Poster.pptx
+++ b/Grupo1_P2-Poster.pptx
@@ -287,7 +287,7 @@
       </p15:sldGuideLst>
     </p:ext>
     <p:ext uri="http://customooxmlschemas.google.com/">
-      <go:slidesCustomData xmlns="" xmlns:go="http://customooxmlschemas.google.com/" xmlns:p15="http://schemas.microsoft.com/office/powerpoint/2012/main" xmlns:p14="http://schemas.microsoft.com/office/powerpoint/2010/main" xmlns:com="http://schemas.openxmlformats.org/drawingml/2006/compatibility" xmlns:pvml="urn:schemas-microsoft-com:office:powerpoint" xmlns:v="urn:schemas-microsoft-com:vml" xmlns:o="urn:schemas-microsoft-com:office:office" xmlns:dgm="http://schemas.openxmlformats.org/drawingml/2006/diagram" xmlns:c="http://schemas.openxmlformats.org/drawingml/2006/chart" xmlns:mv="urn:schemas-microsoft-com:mac:vml" xmlns:mc="http://schemas.openxmlformats.org/markup-compatibility/2006" r:id="rId7" roundtripDataSignature="AMtx7mikYjNCgGV/2O2uv1anaAkZoHec/g=="/>
+      <go:slidesCustomData xmlns:go="http://customooxmlschemas.google.com/" xmlns:p15="http://schemas.microsoft.com/office/powerpoint/2012/main" xmlns:p14="http://schemas.microsoft.com/office/powerpoint/2010/main" xmlns:com="http://schemas.openxmlformats.org/drawingml/2006/compatibility" xmlns:pvml="urn:schemas-microsoft-com:office:powerpoint" xmlns:v="urn:schemas-microsoft-com:vml" xmlns:o="urn:schemas-microsoft-com:office:office" xmlns:dgm="http://schemas.openxmlformats.org/drawingml/2006/diagram" xmlns:c="http://schemas.openxmlformats.org/drawingml/2006/chart" xmlns:mv="urn:schemas-microsoft-com:mac:vml" xmlns:mc="http://schemas.openxmlformats.org/markup-compatibility/2006" xmlns="" r:id="rId7" roundtripDataSignature="AMtx7mikYjNCgGV/2O2uv1anaAkZoHec/g=="/>
     </p:ext>
   </p:extLst>
 </p:presentation>
@@ -1567,7 +1567,7 @@
             </a:pPr>
             <a:fld id="{00000000-1234-1234-1234-123412341234}" type="slidenum">
               <a:rPr lang="es-ES"/>
-              <a:t>‹Nº›</a:t>
+              <a:t>‹#›</a:t>
             </a:fld>
             <a:endParaRPr/>
           </a:p>
@@ -2264,7 +2264,7 @@
             </a:pPr>
             <a:fld id="{00000000-1234-1234-1234-123412341234}" type="slidenum">
               <a:rPr lang="es-ES"/>
-              <a:t>‹Nº›</a:t>
+              <a:t>‹#›</a:t>
             </a:fld>
             <a:endParaRPr/>
           </a:p>
@@ -2961,7 +2961,7 @@
             </a:pPr>
             <a:fld id="{00000000-1234-1234-1234-123412341234}" type="slidenum">
               <a:rPr lang="es-ES"/>
-              <a:t>‹Nº›</a:t>
+              <a:t>‹#›</a:t>
             </a:fld>
             <a:endParaRPr/>
           </a:p>
@@ -3658,7 +3658,7 @@
             </a:pPr>
             <a:fld id="{00000000-1234-1234-1234-123412341234}" type="slidenum">
               <a:rPr lang="es-ES"/>
-              <a:t>‹Nº›</a:t>
+              <a:t>‹#›</a:t>
             </a:fld>
             <a:endParaRPr/>
           </a:p>
@@ -4392,7 +4392,7 @@
             </a:pPr>
             <a:fld id="{00000000-1234-1234-1234-123412341234}" type="slidenum">
               <a:rPr lang="es-ES"/>
-              <a:t>‹Nº›</a:t>
+              <a:t>‹#›</a:t>
             </a:fld>
             <a:endParaRPr/>
           </a:p>
@@ -5249,7 +5249,7 @@
             </a:pPr>
             <a:fld id="{00000000-1234-1234-1234-123412341234}" type="slidenum">
               <a:rPr lang="es-ES"/>
-              <a:t>‹Nº›</a:t>
+              <a:t>‹#›</a:t>
             </a:fld>
             <a:endParaRPr/>
           </a:p>
@@ -6427,7 +6427,7 @@
             </a:pPr>
             <a:fld id="{00000000-1234-1234-1234-123412341234}" type="slidenum">
               <a:rPr lang="es-ES"/>
-              <a:t>‹Nº›</a:t>
+              <a:t>‹#›</a:t>
             </a:fld>
             <a:endParaRPr/>
           </a:p>
@@ -6964,7 +6964,7 @@
             </a:pPr>
             <a:fld id="{00000000-1234-1234-1234-123412341234}" type="slidenum">
               <a:rPr lang="es-ES"/>
-              <a:t>‹Nº›</a:t>
+              <a:t>‹#›</a:t>
             </a:fld>
             <a:endParaRPr/>
           </a:p>
@@ -7365,7 +7365,7 @@
             </a:pPr>
             <a:fld id="{00000000-1234-1234-1234-123412341234}" type="slidenum">
               <a:rPr lang="es-ES"/>
-              <a:t>‹Nº›</a:t>
+              <a:t>‹#›</a:t>
             </a:fld>
             <a:endParaRPr/>
           </a:p>
@@ -8223,7 +8223,7 @@
             </a:pPr>
             <a:fld id="{00000000-1234-1234-1234-123412341234}" type="slidenum">
               <a:rPr lang="es-ES"/>
-              <a:t>‹Nº›</a:t>
+              <a:t>‹#›</a:t>
             </a:fld>
             <a:endParaRPr/>
           </a:p>
@@ -9162,7 +9162,7 @@
             </a:pPr>
             <a:fld id="{00000000-1234-1234-1234-123412341234}" type="slidenum">
               <a:rPr lang="es-ES"/>
-              <a:t>‹Nº›</a:t>
+              <a:t>‹#›</a:t>
             </a:fld>
             <a:endParaRPr/>
           </a:p>
@@ -10173,7 +10173,7 @@
             </a:pPr>
             <a:fld id="{00000000-1234-1234-1234-123412341234}" type="slidenum">
               <a:rPr lang="es-ES"/>
-              <a:t>‹Nº›</a:t>
+              <a:t>‹#›</a:t>
             </a:fld>
             <a:endParaRPr/>
           </a:p>
@@ -13107,18 +13107,18 @@
 </file>
 
 <file path=customXml/item1.xml><?xml version="1.0" encoding="utf-8"?>
+<p:properties xmlns:p="http://schemas.microsoft.com/office/2006/metadata/properties" xmlns:xsi="http://www.w3.org/2001/XMLSchema-instance" xmlns:pc="http://schemas.microsoft.com/office/infopath/2007/PartnerControls">
+  <documentManagement/>
+</p:properties>
+</file>
+
+<file path=customXml/item2.xml><?xml version="1.0" encoding="utf-8"?>
 <?mso-contentType ?>
 <FormTemplates xmlns="http://schemas.microsoft.com/sharepoint/v3/contenttype/forms">
   <Display>DocumentLibraryForm</Display>
   <Edit>DocumentLibraryForm</Edit>
   <New>DocumentLibraryForm</New>
 </FormTemplates>
-</file>
-
-<file path=customXml/item2.xml><?xml version="1.0" encoding="utf-8"?>
-<p:properties xmlns:p="http://schemas.microsoft.com/office/2006/metadata/properties" xmlns:xsi="http://www.w3.org/2001/XMLSchema-instance" xmlns:pc="http://schemas.microsoft.com/office/infopath/2007/PartnerControls">
-  <documentManagement/>
-</p:properties>
 </file>
 
 <file path=customXml/item3.xml><?xml version="1.0" encoding="utf-8"?>
@@ -13272,14 +13272,6 @@
 </file>
 
 <file path=customXml/itemProps1.xml><?xml version="1.0" encoding="utf-8"?>
-<ds:datastoreItem xmlns:ds="http://schemas.openxmlformats.org/officeDocument/2006/customXml" ds:itemID="{C0A08A18-F237-4ACC-9C73-572662C8D094}">
-  <ds:schemaRefs>
-    <ds:schemaRef ds:uri="http://schemas.microsoft.com/sharepoint/v3/contenttype/forms"/>
-  </ds:schemaRefs>
-</ds:datastoreItem>
-</file>
-
-<file path=customXml/itemProps2.xml><?xml version="1.0" encoding="utf-8"?>
 <ds:datastoreItem xmlns:ds="http://schemas.openxmlformats.org/officeDocument/2006/customXml" ds:itemID="{2E6D6E96-2D15-4909-BEF3-495A5AF2E405}">
   <ds:schemaRefs>
     <ds:schemaRef ds:uri="98b3f1ad-107c-497c-bb15-64aaebc89f52"/>
@@ -13296,6 +13288,28 @@
 </ds:datastoreItem>
 </file>
 
+<file path=customXml/itemProps2.xml><?xml version="1.0" encoding="utf-8"?>
+<ds:datastoreItem xmlns:ds="http://schemas.openxmlformats.org/officeDocument/2006/customXml" ds:itemID="{C0A08A18-F237-4ACC-9C73-572662C8D094}">
+  <ds:schemaRefs>
+    <ds:schemaRef ds:uri="http://schemas.microsoft.com/sharepoint/v3/contenttype/forms"/>
+  </ds:schemaRefs>
+</ds:datastoreItem>
+</file>
+
 <file path=customXml/itemProps3.xml><?xml version="1.0" encoding="utf-8"?>
-<ds:datastoreItem xmlns:ds="http://schemas.openxmlformats.org/officeDocument/2006/customXml" ds:itemID="{44B3EEE2-D8E0-4B9B-9F69-30F7A3DF0B62}"/>
+<ds:datastoreItem xmlns:ds="http://schemas.openxmlformats.org/officeDocument/2006/customXml" ds:itemID="{44B3EEE2-D8E0-4B9B-9F69-30F7A3DF0B62}">
+  <ds:schemaRefs>
+    <ds:schemaRef ds:uri="http://schemas.microsoft.com/office/2006/metadata/contentType"/>
+    <ds:schemaRef ds:uri="http://schemas.microsoft.com/office/2006/metadata/properties/metaAttributes"/>
+    <ds:schemaRef ds:uri="http://www.w3.org/2001/XMLSchema"/>
+    <ds:schemaRef ds:uri="http://schemas.microsoft.com/office/2006/metadata/properties"/>
+    <ds:schemaRef ds:uri="1e7bc2c8-5940-466d-9917-0a2ad7932582"/>
+    <ds:schemaRef ds:uri="http://schemas.microsoft.com/office/2006/documentManagement/types"/>
+    <ds:schemaRef ds:uri="http://schemas.microsoft.com/office/infopath/2007/PartnerControls"/>
+    <ds:schemaRef ds:uri="http://schemas.openxmlformats.org/package/2006/metadata/core-properties"/>
+    <ds:schemaRef ds:uri="http://purl.org/dc/elements/1.1/"/>
+    <ds:schemaRef ds:uri="http://purl.org/dc/terms/"/>
+    <ds:schemaRef ds:uri="http://schemas.microsoft.com/internal/obd"/>
+  </ds:schemaRefs>
+</ds:datastoreItem>
 </file>
</xml_diff>